<commit_message>
Made minor edits and corrections to slides for Spiral2.pptx
</commit_message>
<xml_diff>
--- a/Presentation/Spiral2.pptx
+++ b/Presentation/Spiral2.pptx
@@ -446,7 +446,7 @@
           <a:p>
             <a:fld id="{48A87A34-81AB-432B-8DAE-1953F412C126}" type="datetimeFigureOut">
               <a:rPr lang="en-US" smtClean="0"/>
-              <a:t>4/13/2016</a:t>
+              <a:t>4/14/2016</a:t>
             </a:fld>
             <a:endParaRPr lang="en-US" dirty="0"/>
           </a:p>
@@ -770,7 +770,7 @@
           <a:p>
             <a:fld id="{48A87A34-81AB-432B-8DAE-1953F412C126}" type="datetimeFigureOut">
               <a:rPr lang="en-US" smtClean="0"/>
-              <a:t>4/13/2016</a:t>
+              <a:t>4/14/2016</a:t>
             </a:fld>
             <a:endParaRPr lang="en-US" dirty="0"/>
           </a:p>
@@ -1018,7 +1018,7 @@
           <a:p>
             <a:fld id="{48A87A34-81AB-432B-8DAE-1953F412C126}" type="datetimeFigureOut">
               <a:rPr lang="en-US" smtClean="0"/>
-              <a:t>4/13/2016</a:t>
+              <a:t>4/14/2016</a:t>
             </a:fld>
             <a:endParaRPr lang="en-US" dirty="0"/>
           </a:p>
@@ -1357,7 +1357,7 @@
           <a:p>
             <a:fld id="{48A87A34-81AB-432B-8DAE-1953F412C126}" type="datetimeFigureOut">
               <a:rPr lang="en-US" smtClean="0"/>
-              <a:t>4/13/2016</a:t>
+              <a:t>4/14/2016</a:t>
             </a:fld>
             <a:endParaRPr lang="en-US" dirty="0"/>
           </a:p>
@@ -1704,7 +1704,7 @@
           <a:p>
             <a:fld id="{48A87A34-81AB-432B-8DAE-1953F412C126}" type="datetimeFigureOut">
               <a:rPr lang="en-US" smtClean="0"/>
-              <a:t>4/13/2016</a:t>
+              <a:t>4/14/2016</a:t>
             </a:fld>
             <a:endParaRPr lang="en-US" dirty="0"/>
           </a:p>
@@ -2079,7 +2079,7 @@
             <a:fld id="{48A87A34-81AB-432B-8DAE-1953F412C126}" type="datetimeFigureOut">
               <a:rPr lang="en-US" smtClean="0"/>
               <a:pPr/>
-              <a:t>4/13/2016</a:t>
+              <a:t>4/14/2016</a:t>
             </a:fld>
             <a:endParaRPr lang="en-US" dirty="0"/>
           </a:p>
@@ -2551,7 +2551,7 @@
             <a:fld id="{48A87A34-81AB-432B-8DAE-1953F412C126}" type="datetimeFigureOut">
               <a:rPr lang="en-US" smtClean="0"/>
               <a:pPr/>
-              <a:t>4/13/2016</a:t>
+              <a:t>4/14/2016</a:t>
             </a:fld>
             <a:endParaRPr lang="en-US" dirty="0"/>
           </a:p>
@@ -2757,7 +2757,7 @@
           <a:p>
             <a:fld id="{48A87A34-81AB-432B-8DAE-1953F412C126}" type="datetimeFigureOut">
               <a:rPr lang="en-US" smtClean="0"/>
-              <a:t>4/13/2016</a:t>
+              <a:t>4/14/2016</a:t>
             </a:fld>
             <a:endParaRPr lang="en-US" dirty="0"/>
           </a:p>
@@ -2968,7 +2968,7 @@
           <a:p>
             <a:fld id="{48A87A34-81AB-432B-8DAE-1953F412C126}" type="datetimeFigureOut">
               <a:rPr lang="en-US" smtClean="0"/>
-              <a:t>4/13/2016</a:t>
+              <a:t>4/14/2016</a:t>
             </a:fld>
             <a:endParaRPr lang="en-US" dirty="0"/>
           </a:p>
@@ -3200,7 +3200,7 @@
           <a:p>
             <a:fld id="{48A87A34-81AB-432B-8DAE-1953F412C126}" type="datetimeFigureOut">
               <a:rPr lang="en-US" smtClean="0"/>
-              <a:t>4/13/2016</a:t>
+              <a:t>4/14/2016</a:t>
             </a:fld>
             <a:endParaRPr lang="en-US" dirty="0"/>
           </a:p>
@@ -3448,7 +3448,7 @@
           <a:p>
             <a:fld id="{48A87A34-81AB-432B-8DAE-1953F412C126}" type="datetimeFigureOut">
               <a:rPr lang="en-US" smtClean="0"/>
-              <a:t>4/13/2016</a:t>
+              <a:t>4/14/2016</a:t>
             </a:fld>
             <a:endParaRPr lang="en-US" dirty="0"/>
           </a:p>
@@ -3746,7 +3746,7 @@
           <a:p>
             <a:fld id="{48A87A34-81AB-432B-8DAE-1953F412C126}" type="datetimeFigureOut">
               <a:rPr lang="en-US" smtClean="0"/>
-              <a:t>4/13/2016</a:t>
+              <a:t>4/14/2016</a:t>
             </a:fld>
             <a:endParaRPr lang="en-US" dirty="0"/>
           </a:p>
@@ -4140,7 +4140,7 @@
           <a:p>
             <a:fld id="{48A87A34-81AB-432B-8DAE-1953F412C126}" type="datetimeFigureOut">
               <a:rPr lang="en-US" smtClean="0"/>
-              <a:t>4/13/2016</a:t>
+              <a:t>4/14/2016</a:t>
             </a:fld>
             <a:endParaRPr lang="en-US" dirty="0"/>
           </a:p>
@@ -4289,7 +4289,7 @@
           <a:p>
             <a:fld id="{48A87A34-81AB-432B-8DAE-1953F412C126}" type="datetimeFigureOut">
               <a:rPr lang="en-US" smtClean="0"/>
-              <a:t>4/13/2016</a:t>
+              <a:t>4/14/2016</a:t>
             </a:fld>
             <a:endParaRPr lang="en-US" dirty="0"/>
           </a:p>
@@ -4415,7 +4415,7 @@
           <a:p>
             <a:fld id="{48A87A34-81AB-432B-8DAE-1953F412C126}" type="datetimeFigureOut">
               <a:rPr lang="en-US" smtClean="0"/>
-              <a:t>4/13/2016</a:t>
+              <a:t>4/14/2016</a:t>
             </a:fld>
             <a:endParaRPr lang="en-US" dirty="0"/>
           </a:p>
@@ -4670,7 +4670,7 @@
           <a:p>
             <a:fld id="{48A87A34-81AB-432B-8DAE-1953F412C126}" type="datetimeFigureOut">
               <a:rPr lang="en-US" smtClean="0"/>
-              <a:t>4/13/2016</a:t>
+              <a:t>4/14/2016</a:t>
             </a:fld>
             <a:endParaRPr lang="en-US" dirty="0"/>
           </a:p>
@@ -4985,7 +4985,7 @@
           <a:p>
             <a:fld id="{48A87A34-81AB-432B-8DAE-1953F412C126}" type="datetimeFigureOut">
               <a:rPr lang="en-US" smtClean="0"/>
-              <a:t>4/13/2016</a:t>
+              <a:t>4/14/2016</a:t>
             </a:fld>
             <a:endParaRPr lang="en-US" dirty="0"/>
           </a:p>
@@ -5337,7 +5337,7 @@
             <a:fld id="{48A87A34-81AB-432B-8DAE-1953F412C126}" type="datetimeFigureOut">
               <a:rPr lang="en-US" smtClean="0"/>
               <a:pPr/>
-              <a:t>4/13/2016</a:t>
+              <a:t>4/14/2016</a:t>
             </a:fld>
             <a:endParaRPr lang="en-US" dirty="0"/>
           </a:p>
@@ -5907,16 +5907,34 @@
               <a:rPr lang="en-US" cap="none" dirty="0" smtClean="0">
                 <a:latin typeface="Bell MT" panose="02020503060305020303" pitchFamily="18" charset="0"/>
               </a:rPr>
-              <a:t>Tristan Adams</a:t>
-            </a:r>
-          </a:p>
-          <a:p>
+              <a:t>Tristan </a:t>
+            </a:r>
             <a:r>
               <a:rPr lang="en-US" cap="none" dirty="0" smtClean="0">
                 <a:latin typeface="Bell MT" panose="02020503060305020303" pitchFamily="18" charset="0"/>
               </a:rPr>
-              <a:t>Matthew Wheeler</a:t>
-            </a:r>
+              <a:t>Adams – Delivery Leader</a:t>
+            </a:r>
+            <a:endParaRPr lang="en-US" cap="none" dirty="0" smtClean="0">
+              <a:latin typeface="Bell MT" panose="02020503060305020303" pitchFamily="18" charset="0"/>
+            </a:endParaRPr>
+          </a:p>
+          <a:p>
+            <a:r>
+              <a:rPr lang="en-US" cap="none" dirty="0" smtClean="0">
+                <a:latin typeface="Bell MT" panose="02020503060305020303" pitchFamily="18" charset="0"/>
+              </a:rPr>
+              <a:t>Matthew </a:t>
+            </a:r>
+            <a:r>
+              <a:rPr lang="en-US" cap="none" dirty="0" smtClean="0">
+                <a:latin typeface="Bell MT" panose="02020503060305020303" pitchFamily="18" charset="0"/>
+              </a:rPr>
+              <a:t>Wheeler – Requirements Leader</a:t>
+            </a:r>
+            <a:endParaRPr lang="en-US" cap="none" dirty="0" smtClean="0">
+              <a:latin typeface="Bell MT" panose="02020503060305020303" pitchFamily="18" charset="0"/>
+            </a:endParaRPr>
           </a:p>
           <a:p>
             <a:r>
@@ -5926,10 +5944,10 @@
               <a:t>Anil </a:t>
             </a:r>
             <a:r>
-              <a:rPr lang="en-US" cap="none" dirty="0" err="1" smtClean="0">
+              <a:rPr lang="en-US" cap="none" dirty="0" smtClean="0">
                 <a:latin typeface="Bell MT" panose="02020503060305020303" pitchFamily="18" charset="0"/>
               </a:rPr>
-              <a:t>Kendir</a:t>
+              <a:t>Kendir – Facilitator</a:t>
             </a:r>
             <a:endParaRPr lang="en-US" dirty="0" smtClean="0">
               <a:latin typeface="Bell MT" panose="02020503060305020303" pitchFamily="18" charset="0"/>
@@ -5940,15 +5958,30 @@
               <a:rPr lang="en-US" cap="none" dirty="0" smtClean="0">
                 <a:latin typeface="Bell MT" panose="02020503060305020303" pitchFamily="18" charset="0"/>
               </a:rPr>
-              <a:t>Dean Fleming</a:t>
-            </a:r>
-          </a:p>
-          <a:p>
+              <a:t>Dean </a:t>
+            </a:r>
             <a:r>
               <a:rPr lang="en-US" cap="none" dirty="0" smtClean="0">
                 <a:latin typeface="Bell MT" panose="02020503060305020303" pitchFamily="18" charset="0"/>
               </a:rPr>
-              <a:t>Justus Jackson</a:t>
+              <a:t>Fleming – Design Leader</a:t>
+            </a:r>
+            <a:endParaRPr lang="en-US" cap="none" dirty="0" smtClean="0">
+              <a:latin typeface="Bell MT" panose="02020503060305020303" pitchFamily="18" charset="0"/>
+            </a:endParaRPr>
+          </a:p>
+          <a:p>
+            <a:r>
+              <a:rPr lang="en-US" cap="none" dirty="0" smtClean="0">
+                <a:latin typeface="Bell MT" panose="02020503060305020303" pitchFamily="18" charset="0"/>
+              </a:rPr>
+              <a:t>Justus </a:t>
+            </a:r>
+            <a:r>
+              <a:rPr lang="en-US" cap="none" dirty="0" smtClean="0">
+                <a:latin typeface="Bell MT" panose="02020503060305020303" pitchFamily="18" charset="0"/>
+              </a:rPr>
+              <a:t>Jackson – Implementation and Testing Leader</a:t>
             </a:r>
             <a:endParaRPr lang="en-US" cap="none" dirty="0">
               <a:latin typeface="Bell MT" panose="02020503060305020303" pitchFamily="18" charset="0"/>
@@ -6043,19 +6076,7 @@
               <a:rPr lang="en-US" dirty="0" smtClean="0">
                 <a:latin typeface="Bell MT" panose="02020503060305020303" pitchFamily="18" charset="0"/>
               </a:rPr>
-              <a:t>What is </a:t>
-            </a:r>
-            <a:r>
-              <a:rPr lang="en-US" dirty="0" err="1" smtClean="0">
-                <a:latin typeface="Bell MT" panose="02020503060305020303" pitchFamily="18" charset="0"/>
-              </a:rPr>
-              <a:t>VeriHandy</a:t>
-            </a:r>
-            <a:r>
-              <a:rPr lang="en-US" dirty="0" smtClean="0">
-                <a:latin typeface="Bell MT" panose="02020503060305020303" pitchFamily="18" charset="0"/>
-              </a:rPr>
-              <a:t>?</a:t>
+              <a:t>Our Product</a:t>
             </a:r>
             <a:endParaRPr lang="en-US" dirty="0">
               <a:latin typeface="Bell MT" panose="02020503060305020303" pitchFamily="18" charset="0"/>
@@ -6186,7 +6207,7 @@
               <a:rPr lang="en-US" dirty="0" smtClean="0">
                 <a:latin typeface="Bell MT" panose="02020503060305020303" pitchFamily="18" charset="0"/>
               </a:rPr>
-              <a:t>Our Stack</a:t>
+              <a:t>VeriHandy Design</a:t>
             </a:r>
             <a:endParaRPr lang="en-US" dirty="0">
               <a:latin typeface="Bell MT" panose="02020503060305020303" pitchFamily="18" charset="0"/>
@@ -6226,8 +6247,8 @@
           </a:p>
           <a:p>
             <a:r>
-              <a:rPr lang="en-US" dirty="0" err="1" smtClean="0"/>
-              <a:t>MySQl</a:t>
+              <a:rPr lang="en-US" dirty="0" smtClean="0"/>
+              <a:t>MySQL</a:t>
             </a:r>
             <a:endParaRPr lang="en-US" dirty="0" smtClean="0"/>
           </a:p>
@@ -6242,7 +6263,6 @@
               <a:rPr lang="en-US" dirty="0" smtClean="0"/>
               <a:t>CSS</a:t>
             </a:r>
-            <a:endParaRPr lang="en-US" dirty="0" smtClean="0"/>
           </a:p>
         </p:txBody>
       </p:sp>
@@ -6385,7 +6405,7 @@
               <a:rPr lang="en-US" dirty="0" smtClean="0">
                 <a:latin typeface="Bell MT" panose="02020503060305020303" pitchFamily="18" charset="0"/>
               </a:rPr>
-              <a:t>Our Current Build</a:t>
+              <a:t>VeriHandy Demo</a:t>
             </a:r>
             <a:endParaRPr lang="en-US" dirty="0">
               <a:latin typeface="Bell MT" panose="02020503060305020303" pitchFamily="18" charset="0"/>

</xml_diff>

<commit_message>
updated spiral 2 presentation
</commit_message>
<xml_diff>
--- a/Presentation/Spiral2.pptx
+++ b/Presentation/Spiral2.pptx
@@ -6100,19 +6100,7 @@
             </a:r>
             <a:r>
               <a:rPr lang="en-US" dirty="0" smtClean="0"/>
-              <a:t>esigned to combine the </a:t>
-            </a:r>
-            <a:r>
-              <a:rPr lang="en-US" dirty="0" smtClean="0"/>
-              <a:t>convenience</a:t>
-            </a:r>
-            <a:r>
-              <a:rPr lang="en-US" dirty="0" smtClean="0"/>
-              <a:t> </a:t>
-            </a:r>
-            <a:r>
-              <a:rPr lang="en-US" dirty="0" smtClean="0"/>
-              <a:t>of crowd-sourced reviews of local businesses (ex. Angie’s List, LocalHandyManPros) with ease of use (ex. Uber, Craigslist)</a:t>
+              <a:t>esigned to combine the convenience of crowd-sourced reviews of local businesses (ex. Angie’s List, LocalHandyManPros) with ease of use (ex. Uber, Craigslist)</a:t>
             </a:r>
           </a:p>
         </p:txBody>
@@ -6605,8 +6593,8 @@
         </p:nvSpPr>
         <p:spPr/>
         <p:txBody>
-          <a:bodyPr>
-            <a:normAutofit lnSpcReduction="10000"/>
+          <a:bodyPr numCol="2">
+            <a:normAutofit/>
           </a:bodyPr>
           <a:lstStyle/>
           <a:p>
@@ -6632,20 +6620,49 @@
           <a:p>
             <a:r>
               <a:rPr lang="en-US" dirty="0" smtClean="0"/>
-              <a:t>User Profile Page</a:t>
-            </a:r>
-          </a:p>
-          <a:p>
+              <a:t>User Profile </a:t>
+            </a:r>
             <a:r>
               <a:rPr lang="en-US" dirty="0" smtClean="0"/>
-              <a:t>Contact Admin</a:t>
+              <a:t>Page</a:t>
             </a:r>
           </a:p>
           <a:p>
             <a:r>
               <a:rPr lang="en-US" dirty="0" smtClean="0"/>
-              <a:t>Message Sharing System (ex. “A user has accepted your job!”)</a:t>
-            </a:r>
+              <a:t>Google Maps API for Job Search</a:t>
+            </a:r>
+            <a:endParaRPr lang="en-US" dirty="0" smtClean="0"/>
+          </a:p>
+          <a:p>
+            <a:r>
+              <a:rPr lang="en-US" dirty="0" smtClean="0"/>
+              <a:t>Contact </a:t>
+            </a:r>
+            <a:r>
+              <a:rPr lang="en-US" dirty="0" smtClean="0"/>
+              <a:t>Admin</a:t>
+            </a:r>
+          </a:p>
+          <a:p>
+            <a:endParaRPr lang="en-US" dirty="0" smtClean="0"/>
+          </a:p>
+          <a:p>
+            <a:r>
+              <a:rPr lang="en-US" dirty="0" smtClean="0"/>
+              <a:t>Message Sharing System (ex. “A user has accepted your job</a:t>
+            </a:r>
+            <a:r>
+              <a:rPr lang="en-US" dirty="0" smtClean="0"/>
+              <a:t>!”)</a:t>
+            </a:r>
+          </a:p>
+          <a:p>
+            <a:r>
+              <a:rPr lang="en-US" dirty="0" smtClean="0"/>
+              <a:t>PayPal Sandbox(?)</a:t>
+            </a:r>
+            <a:endParaRPr lang="en-US" dirty="0" smtClean="0"/>
           </a:p>
           <a:p>
             <a:r>

</xml_diff>